<commit_message>
Added seperator for pic slide.
</commit_message>
<xml_diff>
--- a/ivey_ppt.pptx
+++ b/ivey_ppt.pptx
@@ -217,7 +217,7 @@
           <a:p>
             <a:fld id="{0F9C1CCF-B725-44A7-AA57-5E433BD85C9F}" type="datetimeFigureOut">
               <a:rPr lang="en-US" smtClean="0"/>
-              <a:t>2/13/2023</a:t>
+              <a:t>2/16/2023</a:t>
             </a:fld>
             <a:endParaRPr lang="en-US"/>
           </a:p>
@@ -2704,6 +2704,49 @@
           </a:p>
         </p:txBody>
       </p:sp>
+      <p:cxnSp>
+        <p:nvCxnSpPr>
+          <p:cNvPr id="5" name="Straight Connector 4">
+            <a:extLst>
+              <a:ext uri="{FF2B5EF4-FFF2-40B4-BE49-F238E27FC236}">
+                <a16:creationId xmlns:a16="http://schemas.microsoft.com/office/drawing/2014/main" id="{7C4C5BB6-8F5D-4C35-AAEB-4196E0BC0135}"/>
+              </a:ext>
+            </a:extLst>
+          </p:cNvPr>
+          <p:cNvCxnSpPr>
+            <a:cxnSpLocks/>
+          </p:cNvCxnSpPr>
+          <p:nvPr userDrawn="1"/>
+        </p:nvCxnSpPr>
+        <p:spPr>
+          <a:xfrm>
+            <a:off x="3218178" y="1349375"/>
+            <a:ext cx="0" cy="2918223"/>
+          </a:xfrm>
+          <a:prstGeom prst="line">
+            <a:avLst/>
+          </a:prstGeom>
+          <a:ln>
+            <a:solidFill>
+              <a:schemeClr val="tx1"/>
+            </a:solidFill>
+          </a:ln>
+        </p:spPr>
+        <p:style>
+          <a:lnRef idx="1">
+            <a:schemeClr val="accent1"/>
+          </a:lnRef>
+          <a:fillRef idx="0">
+            <a:schemeClr val="accent1"/>
+          </a:fillRef>
+          <a:effectRef idx="0">
+            <a:schemeClr val="accent1"/>
+          </a:effectRef>
+          <a:fontRef idx="minor">
+            <a:schemeClr val="tx1"/>
+          </a:fontRef>
+        </p:style>
+      </p:cxnSp>
     </p:spTree>
     <p:extLst>
       <p:ext uri="{BB962C8B-B14F-4D97-AF65-F5344CB8AC3E}">

</xml_diff>